<commit_message>
update chapitre 1 15 aout
</commit_message>
<xml_diff>
--- a/Chapitre1/Chapitre 1.pptx
+++ b/Chapitre1/Chapitre 1.pptx
@@ -231,7 +231,7 @@
           <a:p>
             <a:fld id="{FF69D57C-5ECF-4FB9-9860-78AE21D51D51}" type="datetimeFigureOut">
               <a:rPr lang="en-US" smtClean="0"/>
-              <a:t>8/7/2024</a:t>
+              <a:t>8/14/2024</a:t>
             </a:fld>
             <a:endParaRPr lang="en-US"/>
           </a:p>
@@ -2975,7 +2975,7 @@
           <a:p>
             <a:fld id="{23FDC068-D9A2-4B29-8C02-24D36358B57F}" type="datetimeFigureOut">
               <a:rPr lang="en-US" smtClean="0"/>
-              <a:t>8/7/2024</a:t>
+              <a:t>8/14/2024</a:t>
             </a:fld>
             <a:endParaRPr lang="en-US"/>
           </a:p>
@@ -3183,7 +3183,7 @@
           <a:p>
             <a:fld id="{23FDC068-D9A2-4B29-8C02-24D36358B57F}" type="datetimeFigureOut">
               <a:rPr lang="en-US" smtClean="0"/>
-              <a:t>8/7/2024</a:t>
+              <a:t>8/14/2024</a:t>
             </a:fld>
             <a:endParaRPr lang="en-US"/>
           </a:p>
@@ -3439,7 +3439,7 @@
           <a:p>
             <a:fld id="{23FDC068-D9A2-4B29-8C02-24D36358B57F}" type="datetimeFigureOut">
               <a:rPr lang="en-US" smtClean="0"/>
-              <a:t>8/7/2024</a:t>
+              <a:t>8/14/2024</a:t>
             </a:fld>
             <a:endParaRPr lang="en-US"/>
           </a:p>
@@ -3609,7 +3609,7 @@
           <a:p>
             <a:fld id="{23FDC068-D9A2-4B29-8C02-24D36358B57F}" type="datetimeFigureOut">
               <a:rPr lang="en-US" smtClean="0"/>
-              <a:t>8/7/2024</a:t>
+              <a:t>8/14/2024</a:t>
             </a:fld>
             <a:endParaRPr lang="en-US"/>
           </a:p>
@@ -3952,7 +3952,7 @@
           <a:p>
             <a:fld id="{23FDC068-D9A2-4B29-8C02-24D36358B57F}" type="datetimeFigureOut">
               <a:rPr lang="en-US" smtClean="0"/>
-              <a:t>8/7/2024</a:t>
+              <a:t>8/14/2024</a:t>
             </a:fld>
             <a:endParaRPr lang="en-US"/>
           </a:p>
@@ -4227,7 +4227,7 @@
           <a:p>
             <a:fld id="{23FDC068-D9A2-4B29-8C02-24D36358B57F}" type="datetimeFigureOut">
               <a:rPr lang="en-US" smtClean="0"/>
-              <a:t>8/7/2024</a:t>
+              <a:t>8/14/2024</a:t>
             </a:fld>
             <a:endParaRPr lang="en-US"/>
           </a:p>
@@ -4606,7 +4606,7 @@
           <a:p>
             <a:fld id="{23FDC068-D9A2-4B29-8C02-24D36358B57F}" type="datetimeFigureOut">
               <a:rPr lang="en-US" smtClean="0"/>
-              <a:t>8/7/2024</a:t>
+              <a:t>8/14/2024</a:t>
             </a:fld>
             <a:endParaRPr lang="en-US"/>
           </a:p>
@@ -4724,7 +4724,7 @@
           <a:p>
             <a:fld id="{23FDC068-D9A2-4B29-8C02-24D36358B57F}" type="datetimeFigureOut">
               <a:rPr lang="en-US" smtClean="0"/>
-              <a:t>8/7/2024</a:t>
+              <a:t>8/14/2024</a:t>
             </a:fld>
             <a:endParaRPr lang="en-US"/>
           </a:p>
@@ -4895,7 +4895,7 @@
           <a:p>
             <a:fld id="{23FDC068-D9A2-4B29-8C02-24D36358B57F}" type="datetimeFigureOut">
               <a:rPr lang="en-US" smtClean="0"/>
-              <a:t>8/7/2024</a:t>
+              <a:t>8/14/2024</a:t>
             </a:fld>
             <a:endParaRPr lang="en-US"/>
           </a:p>
@@ -5249,7 +5249,7 @@
           <a:p>
             <a:fld id="{23FDC068-D9A2-4B29-8C02-24D36358B57F}" type="datetimeFigureOut">
               <a:rPr lang="en-US" smtClean="0"/>
-              <a:t>8/7/2024</a:t>
+              <a:t>8/14/2024</a:t>
             </a:fld>
             <a:endParaRPr lang="en-US"/>
           </a:p>
@@ -5626,7 +5626,7 @@
           <a:p>
             <a:fld id="{23FDC068-D9A2-4B29-8C02-24D36358B57F}" type="datetimeFigureOut">
               <a:rPr lang="en-US" smtClean="0"/>
-              <a:t>8/7/2024</a:t>
+              <a:t>8/14/2024</a:t>
             </a:fld>
             <a:endParaRPr lang="en-US"/>
           </a:p>
@@ -5913,7 +5913,7 @@
           <a:p>
             <a:fld id="{23FDC068-D9A2-4B29-8C02-24D36358B57F}" type="datetimeFigureOut">
               <a:rPr lang="en-US" smtClean="0"/>
-              <a:t>8/7/2024</a:t>
+              <a:t>8/14/2024</a:t>
             </a:fld>
             <a:endParaRPr lang="en-US"/>
           </a:p>
@@ -13311,7 +13311,7 @@
 </file>
 
 <file path=ppt/slides/slide20.xml><?xml version="1.0" encoding="utf-8"?>
-<p:sld xmlns:a="http://schemas.openxmlformats.org/drawingml/2006/main" xmlns:r="http://schemas.openxmlformats.org/officeDocument/2006/relationships" xmlns:p="http://schemas.openxmlformats.org/presentationml/2006/main">
+<p:sld xmlns:a="http://schemas.openxmlformats.org/drawingml/2006/main" xmlns:r="http://schemas.openxmlformats.org/officeDocument/2006/relationships" xmlns:p="http://schemas.openxmlformats.org/presentationml/2006/main" show="0">
   <p:cSld>
     <p:spTree>
       <p:nvGrpSpPr>
@@ -13406,13 +13406,13 @@
   <p:clrMapOvr>
     <a:masterClrMapping/>
   </p:clrMapOvr>
-  <mc:AlternateContent xmlns:mc="http://schemas.openxmlformats.org/markup-compatibility/2006" xmlns:p159="http://schemas.microsoft.com/office/powerpoint/2015/09/main">
-    <mc:Choice Requires="p159">
+  <mc:AlternateContent xmlns:mc="http://schemas.openxmlformats.org/markup-compatibility/2006">
+    <mc:Choice xmlns:p159="http://schemas.microsoft.com/office/powerpoint/2015/09/main" Requires="p159">
       <p:transition xmlns:p14="http://schemas.microsoft.com/office/powerpoint/2010/main" spd="slow" p14:dur="2000">
         <p159:morph option="byObject"/>
       </p:transition>
     </mc:Choice>
-    <mc:Fallback xmlns="">
+    <mc:Fallback>
       <p:transition spd="slow">
         <p:fade/>
       </p:transition>
@@ -13467,12 +13467,72 @@
           </a:p>
         </p:txBody>
       </p:sp>
+      <p:sp>
+        <p:nvSpPr>
+          <p:cNvPr id="6" name="ZoneTexte 5">
+            <a:extLst>
+              <a:ext uri="{FF2B5EF4-FFF2-40B4-BE49-F238E27FC236}">
+                <a16:creationId xmlns:a16="http://schemas.microsoft.com/office/drawing/2014/main" id="{FF0B7A92-C773-B101-5964-E3E9335B391E}"/>
+              </a:ext>
+            </a:extLst>
+          </p:cNvPr>
+          <p:cNvSpPr txBox="1"/>
+          <p:nvPr/>
+        </p:nvSpPr>
+        <p:spPr>
+          <a:xfrm>
+            <a:off x="1097280" y="2615448"/>
+            <a:ext cx="10058400" cy="646331"/>
+          </a:xfrm>
+          <a:prstGeom prst="rect">
+            <a:avLst/>
+          </a:prstGeom>
+          <a:noFill/>
+        </p:spPr>
+        <p:txBody>
+          <a:bodyPr wrap="square">
+            <a:spAutoFit/>
+          </a:bodyPr>
+          <a:lstStyle/>
+          <a:p>
+            <a:r>
+              <a:rPr lang="fr-CA" sz="1800" dirty="0"/>
+              <a:t>La </a:t>
+            </a:r>
+            <a:r>
+              <a:rPr lang="fr-CA" sz="1800" b="1" dirty="0"/>
+              <a:t>console</a:t>
+            </a:r>
+            <a:r>
+              <a:rPr lang="fr-CA" sz="1800" dirty="0"/>
+              <a:t> ou aussi appelé </a:t>
+            </a:r>
+            <a:r>
+              <a:rPr lang="fr-CA" sz="1800" dirty="0" err="1"/>
+              <a:t>shell</a:t>
+            </a:r>
+            <a:r>
+              <a:rPr lang="fr-CA" sz="1800" dirty="0"/>
+              <a:t> (en anglais) ou terminal, permet </a:t>
+            </a:r>
+            <a:r>
+              <a:rPr lang="fr-CA" sz="1800" b="1" dirty="0"/>
+              <a:t>d’entrer des instructions et d’afficher vos résultats</a:t>
+            </a:r>
+            <a:r>
+              <a:rPr lang="fr-CA" sz="1800" dirty="0"/>
+              <a:t>.</a:t>
+            </a:r>
+            <a:endParaRPr lang="en-US" dirty="0"/>
+          </a:p>
+        </p:txBody>
+      </p:sp>
       <p:pic>
         <p:nvPicPr>
-          <p:cNvPr id="5" name="Image 4">
+          <p:cNvPr id="4" name="Image 3">
             <a:extLst>
               <a:ext uri="{FF2B5EF4-FFF2-40B4-BE49-F238E27FC236}">
-                <a16:creationId xmlns:a16="http://schemas.microsoft.com/office/drawing/2014/main" id="{4C430941-52D6-EFBB-79DC-28281A898840}"/>
+                <a16:creationId xmlns:a16="http://schemas.microsoft.com/office/drawing/2014/main" id="{9C395321-A8EE-7BCA-8E50-35AAE15D063A}"/>
               </a:ext>
             </a:extLst>
           </p:cNvPr>
@@ -13489,74 +13549,14 @@
         </p:blipFill>
         <p:spPr>
           <a:xfrm>
-            <a:off x="2262554" y="3862868"/>
-            <a:ext cx="7666892" cy="1972191"/>
+            <a:off x="2056836" y="3429000"/>
+            <a:ext cx="8078327" cy="1819529"/>
           </a:xfrm>
           <a:prstGeom prst="rect">
             <a:avLst/>
           </a:prstGeom>
         </p:spPr>
       </p:pic>
-      <p:sp>
-        <p:nvSpPr>
-          <p:cNvPr id="6" name="ZoneTexte 5">
-            <a:extLst>
-              <a:ext uri="{FF2B5EF4-FFF2-40B4-BE49-F238E27FC236}">
-                <a16:creationId xmlns:a16="http://schemas.microsoft.com/office/drawing/2014/main" id="{FF0B7A92-C773-B101-5964-E3E9335B391E}"/>
-              </a:ext>
-            </a:extLst>
-          </p:cNvPr>
-          <p:cNvSpPr txBox="1"/>
-          <p:nvPr/>
-        </p:nvSpPr>
-        <p:spPr>
-          <a:xfrm>
-            <a:off x="1097280" y="2615448"/>
-            <a:ext cx="10058400" cy="646331"/>
-          </a:xfrm>
-          <a:prstGeom prst="rect">
-            <a:avLst/>
-          </a:prstGeom>
-          <a:noFill/>
-        </p:spPr>
-        <p:txBody>
-          <a:bodyPr wrap="square">
-            <a:spAutoFit/>
-          </a:bodyPr>
-          <a:lstStyle/>
-          <a:p>
-            <a:r>
-              <a:rPr lang="fr-CA" sz="1800" dirty="0"/>
-              <a:t>La </a:t>
-            </a:r>
-            <a:r>
-              <a:rPr lang="fr-CA" sz="1800" b="1" dirty="0"/>
-              <a:t>console</a:t>
-            </a:r>
-            <a:r>
-              <a:rPr lang="fr-CA" sz="1800" dirty="0"/>
-              <a:t> ou aussi appelé </a:t>
-            </a:r>
-            <a:r>
-              <a:rPr lang="fr-CA" sz="1800" dirty="0" err="1"/>
-              <a:t>shell</a:t>
-            </a:r>
-            <a:r>
-              <a:rPr lang="fr-CA" sz="1800" dirty="0"/>
-              <a:t> (en anglais) ou terminal, permet </a:t>
-            </a:r>
-            <a:r>
-              <a:rPr lang="fr-CA" sz="1800" b="1" dirty="0"/>
-              <a:t>d’entrer des instructions et d’afficher vos résultats</a:t>
-            </a:r>
-            <a:r>
-              <a:rPr lang="fr-CA" sz="1800" dirty="0"/>
-              <a:t>.</a:t>
-            </a:r>
-            <a:endParaRPr lang="en-US" dirty="0"/>
-          </a:p>
-        </p:txBody>
-      </p:sp>
     </p:spTree>
     <p:extLst>
       <p:ext uri="{BB962C8B-B14F-4D97-AF65-F5344CB8AC3E}">
@@ -13628,12 +13628,89 @@
           </a:p>
         </p:txBody>
       </p:sp>
+      <p:sp>
+        <p:nvSpPr>
+          <p:cNvPr id="7" name="ZoneTexte 6">
+            <a:extLst>
+              <a:ext uri="{FF2B5EF4-FFF2-40B4-BE49-F238E27FC236}">
+                <a16:creationId xmlns:a16="http://schemas.microsoft.com/office/drawing/2014/main" id="{ACCB891B-ED5D-522C-5CBE-62C1655BC9D0}"/>
+              </a:ext>
+            </a:extLst>
+          </p:cNvPr>
+          <p:cNvSpPr txBox="1"/>
+          <p:nvPr/>
+        </p:nvSpPr>
+        <p:spPr>
+          <a:xfrm>
+            <a:off x="1097280" y="1881637"/>
+            <a:ext cx="10058400" cy="1200329"/>
+          </a:xfrm>
+          <a:prstGeom prst="rect">
+            <a:avLst/>
+          </a:prstGeom>
+          <a:noFill/>
+        </p:spPr>
+        <p:txBody>
+          <a:bodyPr wrap="square">
+            <a:spAutoFit/>
+          </a:bodyPr>
+          <a:lstStyle/>
+          <a:p>
+            <a:r>
+              <a:rPr lang="fr-FR" dirty="0">
+                <a:solidFill>
+                  <a:srgbClr val="000000"/>
+                </a:solidFill>
+                <a:effectLst/>
+              </a:rPr>
+              <a:t>Lorsque nos programmes comportent plusieurs lignes d’instruction, il est préférable d’utiliser </a:t>
+            </a:r>
+            <a:r>
+              <a:rPr lang="fr-FR" b="1" dirty="0">
+                <a:solidFill>
+                  <a:srgbClr val="000000"/>
+                </a:solidFill>
+                <a:effectLst/>
+              </a:rPr>
+              <a:t>l’éditeur de programme</a:t>
+            </a:r>
+            <a:r>
+              <a:rPr lang="fr-FR" dirty="0">
+                <a:solidFill>
+                  <a:srgbClr val="000000"/>
+                </a:solidFill>
+                <a:effectLst/>
+              </a:rPr>
+              <a:t>. Celui-ci peut être vu comme un </a:t>
+            </a:r>
+            <a:r>
+              <a:rPr lang="fr-FR" b="1" dirty="0">
+                <a:solidFill>
+                  <a:srgbClr val="000000"/>
+                </a:solidFill>
+                <a:effectLst/>
+              </a:rPr>
+              <a:t>traitement de texte spécialisé pour la programmation</a:t>
+            </a:r>
+            <a:r>
+              <a:rPr lang="fr-FR" dirty="0">
+                <a:solidFill>
+                  <a:srgbClr val="000000"/>
+                </a:solidFill>
+                <a:effectLst/>
+              </a:rPr>
+              <a:t>. Il faut noter que le code de nos programmes s’exécute de façon procédurale (on exécute les lignes de haut en bas).</a:t>
+            </a:r>
+            <a:endParaRPr lang="en-US" dirty="0"/>
+          </a:p>
+        </p:txBody>
+      </p:sp>
       <p:pic>
         <p:nvPicPr>
-          <p:cNvPr id="4" name="Image 3">
+          <p:cNvPr id="5" name="Image 4">
             <a:extLst>
               <a:ext uri="{FF2B5EF4-FFF2-40B4-BE49-F238E27FC236}">
-                <a16:creationId xmlns:a16="http://schemas.microsoft.com/office/drawing/2014/main" id="{38311C9A-30AC-5126-D92D-BA1B04DD74A8}"/>
+                <a16:creationId xmlns:a16="http://schemas.microsoft.com/office/drawing/2014/main" id="{6020060E-6C14-8E4B-CA58-9553F681ED8A}"/>
               </a:ext>
             </a:extLst>
           </p:cNvPr>
@@ -13650,91 +13727,14 @@
         </p:blipFill>
         <p:spPr>
           <a:xfrm>
-            <a:off x="2907323" y="3152889"/>
-            <a:ext cx="6377354" cy="3069823"/>
+            <a:off x="2635850" y="3776035"/>
+            <a:ext cx="6407163" cy="2135721"/>
           </a:xfrm>
           <a:prstGeom prst="rect">
             <a:avLst/>
           </a:prstGeom>
         </p:spPr>
       </p:pic>
-      <p:sp>
-        <p:nvSpPr>
-          <p:cNvPr id="7" name="ZoneTexte 6">
-            <a:extLst>
-              <a:ext uri="{FF2B5EF4-FFF2-40B4-BE49-F238E27FC236}">
-                <a16:creationId xmlns:a16="http://schemas.microsoft.com/office/drawing/2014/main" id="{ACCB891B-ED5D-522C-5CBE-62C1655BC9D0}"/>
-              </a:ext>
-            </a:extLst>
-          </p:cNvPr>
-          <p:cNvSpPr txBox="1"/>
-          <p:nvPr/>
-        </p:nvSpPr>
-        <p:spPr>
-          <a:xfrm>
-            <a:off x="1097280" y="1881637"/>
-            <a:ext cx="10058400" cy="1200329"/>
-          </a:xfrm>
-          <a:prstGeom prst="rect">
-            <a:avLst/>
-          </a:prstGeom>
-          <a:noFill/>
-        </p:spPr>
-        <p:txBody>
-          <a:bodyPr wrap="square">
-            <a:spAutoFit/>
-          </a:bodyPr>
-          <a:lstStyle/>
-          <a:p>
-            <a:r>
-              <a:rPr lang="fr-FR" dirty="0">
-                <a:solidFill>
-                  <a:srgbClr val="000000"/>
-                </a:solidFill>
-                <a:effectLst/>
-              </a:rPr>
-              <a:t>Lorsque nos programmes comportent plusieurs lignes d’instruction, il est préférable d’utiliser </a:t>
-            </a:r>
-            <a:r>
-              <a:rPr lang="fr-FR" b="1" dirty="0">
-                <a:solidFill>
-                  <a:srgbClr val="000000"/>
-                </a:solidFill>
-                <a:effectLst/>
-              </a:rPr>
-              <a:t>l’éditeur de programme</a:t>
-            </a:r>
-            <a:r>
-              <a:rPr lang="fr-FR" dirty="0">
-                <a:solidFill>
-                  <a:srgbClr val="000000"/>
-                </a:solidFill>
-                <a:effectLst/>
-              </a:rPr>
-              <a:t>. Celui-ci peut être vu comme un </a:t>
-            </a:r>
-            <a:r>
-              <a:rPr lang="fr-FR" b="1" dirty="0">
-                <a:solidFill>
-                  <a:srgbClr val="000000"/>
-                </a:solidFill>
-                <a:effectLst/>
-              </a:rPr>
-              <a:t>traitement de texte spécialisé pour la programmation</a:t>
-            </a:r>
-            <a:r>
-              <a:rPr lang="fr-FR" dirty="0">
-                <a:solidFill>
-                  <a:srgbClr val="000000"/>
-                </a:solidFill>
-                <a:effectLst/>
-              </a:rPr>
-              <a:t>. Il faut noter que le code de nos programmes s’exécute de façon procédurale (on exécute les lignes de haut en bas).</a:t>
-            </a:r>
-            <a:endParaRPr lang="en-US" dirty="0"/>
-          </a:p>
-        </p:txBody>
-      </p:sp>
     </p:spTree>
     <p:extLst>
       <p:ext uri="{BB962C8B-B14F-4D97-AF65-F5344CB8AC3E}">
@@ -13936,7 +13936,7 @@
 </file>
 
 <file path=ppt/slides/slide24.xml><?xml version="1.0" encoding="utf-8"?>
-<p:sld xmlns:a="http://schemas.openxmlformats.org/drawingml/2006/main" xmlns:r="http://schemas.openxmlformats.org/officeDocument/2006/relationships" xmlns:p="http://schemas.openxmlformats.org/presentationml/2006/main">
+<p:sld xmlns:a="http://schemas.openxmlformats.org/drawingml/2006/main" xmlns:r="http://schemas.openxmlformats.org/officeDocument/2006/relationships" xmlns:p="http://schemas.openxmlformats.org/presentationml/2006/main" show="0">
   <p:cSld>
     <p:spTree>
       <p:nvGrpSpPr>
@@ -14336,13 +14336,13 @@
   <p:clrMapOvr>
     <a:masterClrMapping/>
   </p:clrMapOvr>
-  <mc:AlternateContent xmlns:mc="http://schemas.openxmlformats.org/markup-compatibility/2006" xmlns:p159="http://schemas.microsoft.com/office/powerpoint/2015/09/main">
-    <mc:Choice Requires="p159">
+  <mc:AlternateContent xmlns:mc="http://schemas.openxmlformats.org/markup-compatibility/2006">
+    <mc:Choice xmlns:p159="http://schemas.microsoft.com/office/powerpoint/2015/09/main" Requires="p159">
       <p:transition xmlns:p14="http://schemas.microsoft.com/office/powerpoint/2010/main" spd="slow" p14:dur="2000">
         <p159:morph option="byObject"/>
       </p:transition>
     </mc:Choice>
-    <mc:Fallback xmlns="">
+    <mc:Fallback>
       <p:transition spd="slow">
         <p:fade/>
       </p:transition>

</xml_diff>